<commit_message>
didn't save before commit
</commit_message>
<xml_diff>
--- a/osconversion.pptx
+++ b/osconversion.pptx
@@ -5,17 +5,18 @@
     <p:sldMasterId id="2147483684" r:id="rId1"/>
   </p:sldMasterIdLst>
   <p:notesMasterIdLst>
-    <p:notesMasterId r:id="rId10"/>
+    <p:notesMasterId r:id="rId11"/>
   </p:notesMasterIdLst>
   <p:sldIdLst>
     <p:sldId id="256" r:id="rId2"/>
     <p:sldId id="269" r:id="rId3"/>
     <p:sldId id="261" r:id="rId4"/>
-    <p:sldId id="264" r:id="rId5"/>
-    <p:sldId id="266" r:id="rId6"/>
-    <p:sldId id="265" r:id="rId7"/>
-    <p:sldId id="267" r:id="rId8"/>
-    <p:sldId id="268" r:id="rId9"/>
+    <p:sldId id="270" r:id="rId5"/>
+    <p:sldId id="264" r:id="rId6"/>
+    <p:sldId id="266" r:id="rId7"/>
+    <p:sldId id="265" r:id="rId8"/>
+    <p:sldId id="267" r:id="rId9"/>
+    <p:sldId id="268" r:id="rId10"/>
   </p:sldIdLst>
   <p:sldSz cx="9144000" cy="6858000" type="screen4x3"/>
   <p:notesSz cx="6858000" cy="9144000"/>
@@ -632,7 +633,7 @@
           <a:p>
             <a:fld id="{CA985D88-9472-488B-B4FE-1429C3D5EA23}" type="slidenum">
               <a:rPr lang="en-US" smtClean="0"/>
-              <a:t>8</a:t>
+              <a:t>9</a:t>
             </a:fld>
             <a:endParaRPr lang="en-US"/>
           </a:p>
@@ -4243,6 +4244,226 @@
           <a:chExt cx="0" cy="0"/>
         </a:xfrm>
       </p:grpSpPr>
+      <p:sp>
+        <p:nvSpPr>
+          <p:cNvPr id="5" name="TextBox 4"/>
+          <p:cNvSpPr txBox="1"/>
+          <p:nvPr/>
+        </p:nvSpPr>
+        <p:spPr>
+          <a:xfrm>
+            <a:off x="533400" y="533400"/>
+            <a:ext cx="8229600" cy="2800767"/>
+          </a:xfrm>
+          <a:prstGeom prst="rect">
+            <a:avLst/>
+          </a:prstGeom>
+          <a:noFill/>
+        </p:spPr>
+        <p:txBody>
+          <a:bodyPr wrap="square" rtlCol="0">
+            <a:spAutoFit/>
+          </a:bodyPr>
+          <a:lstStyle/>
+          <a:p>
+            <a:r>
+              <a:rPr lang="es-ES" sz="1600" b="1" dirty="0" err="1">
+                <a:latin typeface="Courier" pitchFamily="49" charset="0"/>
+                <a:cs typeface="Aharoni" pitchFamily="2" charset="-79"/>
+              </a:rPr>
+              <a:t>constrain_demo</a:t>
+            </a:r>
+            <a:r>
+              <a:rPr lang="es-ES" sz="1600" b="1" dirty="0">
+                <a:latin typeface="Courier" pitchFamily="49" charset="0"/>
+                <a:cs typeface="Aharoni" pitchFamily="2" charset="-79"/>
+              </a:rPr>
+              <a:t>(X) :-</a:t>
+            </a:r>
+          </a:p>
+          <a:p>
+            <a:r>
+              <a:rPr lang="es-ES" sz="1600" b="1" dirty="0">
+                <a:latin typeface="Courier" pitchFamily="49" charset="0"/>
+                <a:cs typeface="Aharoni" pitchFamily="2" charset="-79"/>
+              </a:rPr>
+              <a:t>	X in 1..5,</a:t>
+            </a:r>
+          </a:p>
+          <a:p>
+            <a:r>
+              <a:rPr lang="es-ES" sz="1600" b="1" dirty="0">
+                <a:latin typeface="Courier" pitchFamily="49" charset="0"/>
+                <a:cs typeface="Aharoni" pitchFamily="2" charset="-79"/>
+              </a:rPr>
+              <a:t>	</a:t>
+            </a:r>
+            <a:r>
+              <a:rPr lang="es-ES" sz="1600" b="1" dirty="0" err="1">
+                <a:latin typeface="Courier" pitchFamily="49" charset="0"/>
+                <a:cs typeface="Aharoni" pitchFamily="2" charset="-79"/>
+              </a:rPr>
+              <a:t>foo</a:t>
+            </a:r>
+            <a:r>
+              <a:rPr lang="es-ES" sz="1600" b="1" dirty="0">
+                <a:latin typeface="Courier" pitchFamily="49" charset="0"/>
+                <a:cs typeface="Aharoni" pitchFamily="2" charset="-79"/>
+              </a:rPr>
+              <a:t>(X),</a:t>
+            </a:r>
+          </a:p>
+          <a:p>
+            <a:r>
+              <a:rPr lang="es-ES" sz="1600" b="1" dirty="0">
+                <a:latin typeface="Courier" pitchFamily="49" charset="0"/>
+                <a:cs typeface="Aharoni" pitchFamily="2" charset="-79"/>
+              </a:rPr>
+              <a:t>	</a:t>
+            </a:r>
+            <a:r>
+              <a:rPr lang="es-ES" sz="1600" b="1" dirty="0" err="1">
+                <a:latin typeface="Courier" pitchFamily="49" charset="0"/>
+                <a:cs typeface="Aharoni" pitchFamily="2" charset="-79"/>
+              </a:rPr>
+              <a:t>label</a:t>
+            </a:r>
+            <a:r>
+              <a:rPr lang="es-ES" sz="1600" b="1" dirty="0">
+                <a:latin typeface="Courier" pitchFamily="49" charset="0"/>
+                <a:cs typeface="Aharoni" pitchFamily="2" charset="-79"/>
+              </a:rPr>
+              <a:t>([X]).</a:t>
+            </a:r>
+          </a:p>
+          <a:p>
+            <a:endParaRPr lang="es-ES" sz="1600" b="1" dirty="0">
+              <a:latin typeface="Courier" pitchFamily="49" charset="0"/>
+              <a:cs typeface="Aharoni" pitchFamily="2" charset="-79"/>
+            </a:endParaRPr>
+          </a:p>
+          <a:p>
+            <a:r>
+              <a:rPr lang="es-ES" sz="1600" b="1" dirty="0" err="1">
+                <a:latin typeface="Courier" pitchFamily="49" charset="0"/>
+                <a:cs typeface="Aharoni" pitchFamily="2" charset="-79"/>
+              </a:rPr>
+              <a:t>foo</a:t>
+            </a:r>
+            <a:r>
+              <a:rPr lang="es-ES" sz="1600" b="1" dirty="0">
+                <a:latin typeface="Courier" pitchFamily="49" charset="0"/>
+                <a:cs typeface="Aharoni" pitchFamily="2" charset="-79"/>
+              </a:rPr>
+              <a:t>(X) :- X in 3..7 </a:t>
+            </a:r>
+            <a:r>
+              <a:rPr lang="es-ES" sz="1600" b="1" dirty="0" smtClean="0">
+                <a:latin typeface="Courier" pitchFamily="49" charset="0"/>
+                <a:cs typeface="Aharoni" pitchFamily="2" charset="-79"/>
+              </a:rPr>
+              <a:t>.</a:t>
+            </a:r>
+          </a:p>
+          <a:p>
+            <a:endParaRPr lang="es-ES" sz="1600" b="1" dirty="0">
+              <a:latin typeface="Courier" pitchFamily="49" charset="0"/>
+              <a:cs typeface="Aharoni" pitchFamily="2" charset="-79"/>
+            </a:endParaRPr>
+          </a:p>
+          <a:p>
+            <a:r>
+              <a:rPr lang="fr-FR" sz="1600" b="1" dirty="0">
+                <a:latin typeface="Courier" pitchFamily="49" charset="0"/>
+                <a:cs typeface="Aharoni" pitchFamily="2" charset="-79"/>
+              </a:rPr>
+              <a:t>2 ?- </a:t>
+            </a:r>
+            <a:r>
+              <a:rPr lang="fr-FR" sz="1600" b="1" dirty="0" err="1">
+                <a:latin typeface="Courier" pitchFamily="49" charset="0"/>
+                <a:cs typeface="Aharoni" pitchFamily="2" charset="-79"/>
+              </a:rPr>
+              <a:t>constrain_demo</a:t>
+            </a:r>
+            <a:r>
+              <a:rPr lang="fr-FR" sz="1600" b="1" dirty="0">
+                <a:latin typeface="Courier" pitchFamily="49" charset="0"/>
+                <a:cs typeface="Aharoni" pitchFamily="2" charset="-79"/>
+              </a:rPr>
+              <a:t>(X).</a:t>
+            </a:r>
+          </a:p>
+          <a:p>
+            <a:r>
+              <a:rPr lang="fr-FR" sz="1600" b="1" dirty="0">
+                <a:latin typeface="Courier" pitchFamily="49" charset="0"/>
+                <a:cs typeface="Aharoni" pitchFamily="2" charset="-79"/>
+              </a:rPr>
+              <a:t>X = 3 ;</a:t>
+            </a:r>
+          </a:p>
+          <a:p>
+            <a:r>
+              <a:rPr lang="fr-FR" sz="1600" b="1" dirty="0">
+                <a:latin typeface="Courier" pitchFamily="49" charset="0"/>
+                <a:cs typeface="Aharoni" pitchFamily="2" charset="-79"/>
+              </a:rPr>
+              <a:t>X = 4 ;</a:t>
+            </a:r>
+          </a:p>
+          <a:p>
+            <a:r>
+              <a:rPr lang="fr-FR" sz="1600" b="1" dirty="0">
+                <a:latin typeface="Courier" pitchFamily="49" charset="0"/>
+                <a:cs typeface="Aharoni" pitchFamily="2" charset="-79"/>
+              </a:rPr>
+              <a:t>X = 5</a:t>
+            </a:r>
+            <a:r>
+              <a:rPr lang="fr-FR" sz="1600" b="1" dirty="0" smtClean="0">
+                <a:latin typeface="Courier" pitchFamily="49" charset="0"/>
+                <a:cs typeface="Aharoni" pitchFamily="2" charset="-79"/>
+              </a:rPr>
+              <a:t>.</a:t>
+            </a:r>
+            <a:endParaRPr lang="fr-FR" sz="1600" b="1" dirty="0">
+              <a:latin typeface="Courier" pitchFamily="49" charset="0"/>
+              <a:cs typeface="Aharoni" pitchFamily="2" charset="-79"/>
+            </a:endParaRPr>
+          </a:p>
+        </p:txBody>
+      </p:sp>
+    </p:spTree>
+    <p:extLst>
+      <p:ext uri="{BB962C8B-B14F-4D97-AF65-F5344CB8AC3E}">
+        <p14:creationId xmlns:p14="http://schemas.microsoft.com/office/powerpoint/2010/main" val="4501990"/>
+      </p:ext>
+    </p:extLst>
+  </p:cSld>
+  <p:clrMapOvr>
+    <a:masterClrMapping/>
+  </p:clrMapOvr>
+</p:sld>
+</file>
+
+<file path=ppt/slides/slide5.xml><?xml version="1.0" encoding="utf-8"?>
+<p:sld xmlns:a="http://schemas.openxmlformats.org/drawingml/2006/main" xmlns:r="http://schemas.openxmlformats.org/officeDocument/2006/relationships" xmlns:p="http://schemas.openxmlformats.org/presentationml/2006/main">
+  <p:cSld>
+    <p:spTree>
+      <p:nvGrpSpPr>
+        <p:cNvPr id="1" name=""/>
+        <p:cNvGrpSpPr/>
+        <p:nvPr/>
+      </p:nvGrpSpPr>
+      <p:grpSpPr>
+        <a:xfrm>
+          <a:off x="0" y="0"/>
+          <a:ext cx="0" cy="0"/>
+          <a:chOff x="0" y="0"/>
+          <a:chExt cx="0" cy="0"/>
+        </a:xfrm>
+      </p:grpSpPr>
       <p:pic>
         <p:nvPicPr>
           <p:cNvPr id="4" name="Picture 3"/>
@@ -4293,7 +4514,7 @@
 </p:sld>
 </file>
 
-<file path=ppt/slides/slide5.xml><?xml version="1.0" encoding="utf-8"?>
+<file path=ppt/slides/slide6.xml><?xml version="1.0" encoding="utf-8"?>
 <p:sld xmlns:a="http://schemas.openxmlformats.org/drawingml/2006/main" xmlns:r="http://schemas.openxmlformats.org/officeDocument/2006/relationships" xmlns:p="http://schemas.openxmlformats.org/presentationml/2006/main">
   <p:cSld>
     <p:spTree>
@@ -4360,7 +4581,7 @@
 </p:sld>
 </file>
 
-<file path=ppt/slides/slide6.xml><?xml version="1.0" encoding="utf-8"?>
+<file path=ppt/slides/slide7.xml><?xml version="1.0" encoding="utf-8"?>
 <p:sld xmlns:a="http://schemas.openxmlformats.org/drawingml/2006/main" xmlns:r="http://schemas.openxmlformats.org/officeDocument/2006/relationships" xmlns:p="http://schemas.openxmlformats.org/presentationml/2006/main">
   <p:cSld>
     <p:spTree>
@@ -4427,7 +4648,7 @@
 </p:sld>
 </file>
 
-<file path=ppt/slides/slide7.xml><?xml version="1.0" encoding="utf-8"?>
+<file path=ppt/slides/slide8.xml><?xml version="1.0" encoding="utf-8"?>
 <p:sld xmlns:a="http://schemas.openxmlformats.org/drawingml/2006/main" xmlns:r="http://schemas.openxmlformats.org/officeDocument/2006/relationships" xmlns:p="http://schemas.openxmlformats.org/presentationml/2006/main">
   <p:cSld>
     <p:spTree>
@@ -4494,7 +4715,7 @@
 </p:sld>
 </file>
 
-<file path=ppt/slides/slide8.xml><?xml version="1.0" encoding="utf-8"?>
+<file path=ppt/slides/slide9.xml><?xml version="1.0" encoding="utf-8"?>
 <p:sld xmlns:a="http://schemas.openxmlformats.org/drawingml/2006/main" xmlns:r="http://schemas.openxmlformats.org/officeDocument/2006/relationships" xmlns:p="http://schemas.openxmlformats.org/presentationml/2006/main">
   <p:cSld>
     <p:spTree>

</xml_diff>